<commit_message>
Add a brownbag style PPT
</commit_message>
<xml_diff>
--- a/demo/brownbag.pptx
+++ b/demo/brownbag.pptx
@@ -263,7 +263,7 @@
           <a:p>
             <a:fld id="{44E6C336-FAC9-6D49-A0EB-D472925C8CE9}" type="datetimeFigureOut">
               <a:rPr lang="en-US" smtClean="0"/>
-              <a:t>11/12/19</a:t>
+              <a:t>11/19/19</a:t>
             </a:fld>
             <a:endParaRPr lang="en-US"/>
           </a:p>
@@ -461,7 +461,7 @@
           <a:p>
             <a:fld id="{44E6C336-FAC9-6D49-A0EB-D472925C8CE9}" type="datetimeFigureOut">
               <a:rPr lang="en-US" smtClean="0"/>
-              <a:t>11/12/19</a:t>
+              <a:t>11/19/19</a:t>
             </a:fld>
             <a:endParaRPr lang="en-US"/>
           </a:p>
@@ -669,7 +669,7 @@
           <a:p>
             <a:fld id="{44E6C336-FAC9-6D49-A0EB-D472925C8CE9}" type="datetimeFigureOut">
               <a:rPr lang="en-US" smtClean="0"/>
-              <a:t>11/12/19</a:t>
+              <a:t>11/19/19</a:t>
             </a:fld>
             <a:endParaRPr lang="en-US"/>
           </a:p>
@@ -867,7 +867,7 @@
           <a:p>
             <a:fld id="{44E6C336-FAC9-6D49-A0EB-D472925C8CE9}" type="datetimeFigureOut">
               <a:rPr lang="en-US" smtClean="0"/>
-              <a:t>11/12/19</a:t>
+              <a:t>11/19/19</a:t>
             </a:fld>
             <a:endParaRPr lang="en-US"/>
           </a:p>
@@ -1142,7 +1142,7 @@
           <a:p>
             <a:fld id="{44E6C336-FAC9-6D49-A0EB-D472925C8CE9}" type="datetimeFigureOut">
               <a:rPr lang="en-US" smtClean="0"/>
-              <a:t>11/12/19</a:t>
+              <a:t>11/19/19</a:t>
             </a:fld>
             <a:endParaRPr lang="en-US"/>
           </a:p>
@@ -1407,7 +1407,7 @@
           <a:p>
             <a:fld id="{44E6C336-FAC9-6D49-A0EB-D472925C8CE9}" type="datetimeFigureOut">
               <a:rPr lang="en-US" smtClean="0"/>
-              <a:t>11/12/19</a:t>
+              <a:t>11/19/19</a:t>
             </a:fld>
             <a:endParaRPr lang="en-US"/>
           </a:p>
@@ -1819,7 +1819,7 @@
           <a:p>
             <a:fld id="{44E6C336-FAC9-6D49-A0EB-D472925C8CE9}" type="datetimeFigureOut">
               <a:rPr lang="en-US" smtClean="0"/>
-              <a:t>11/12/19</a:t>
+              <a:t>11/19/19</a:t>
             </a:fld>
             <a:endParaRPr lang="en-US"/>
           </a:p>
@@ -1960,7 +1960,7 @@
           <a:p>
             <a:fld id="{44E6C336-FAC9-6D49-A0EB-D472925C8CE9}" type="datetimeFigureOut">
               <a:rPr lang="en-US" smtClean="0"/>
-              <a:t>11/12/19</a:t>
+              <a:t>11/19/19</a:t>
             </a:fld>
             <a:endParaRPr lang="en-US"/>
           </a:p>
@@ -2073,7 +2073,7 @@
           <a:p>
             <a:fld id="{44E6C336-FAC9-6D49-A0EB-D472925C8CE9}" type="datetimeFigureOut">
               <a:rPr lang="en-US" smtClean="0"/>
-              <a:t>11/12/19</a:t>
+              <a:t>11/19/19</a:t>
             </a:fld>
             <a:endParaRPr lang="en-US"/>
           </a:p>
@@ -2384,7 +2384,7 @@
           <a:p>
             <a:fld id="{44E6C336-FAC9-6D49-A0EB-D472925C8CE9}" type="datetimeFigureOut">
               <a:rPr lang="en-US" smtClean="0"/>
-              <a:t>11/12/19</a:t>
+              <a:t>11/19/19</a:t>
             </a:fld>
             <a:endParaRPr lang="en-US"/>
           </a:p>
@@ -2672,7 +2672,7 @@
           <a:p>
             <a:fld id="{44E6C336-FAC9-6D49-A0EB-D472925C8CE9}" type="datetimeFigureOut">
               <a:rPr lang="en-US" smtClean="0"/>
-              <a:t>11/12/19</a:t>
+              <a:t>11/19/19</a:t>
             </a:fld>
             <a:endParaRPr lang="en-US"/>
           </a:p>
@@ -2913,7 +2913,7 @@
           <a:p>
             <a:fld id="{44E6C336-FAC9-6D49-A0EB-D472925C8CE9}" type="datetimeFigureOut">
               <a:rPr lang="en-US" smtClean="0"/>
-              <a:t>11/12/19</a:t>
+              <a:t>11/19/19</a:t>
             </a:fld>
             <a:endParaRPr lang="en-US"/>
           </a:p>
@@ -3353,7 +3353,14 @@
           <a:p>
             <a:r>
               <a:rPr lang="en-US" dirty="0"/>
-              <a:t>IoT Core managed device OTA tool</a:t>
+              <a:t>An OTA tool</a:t>
+            </a:r>
+            <a:br>
+              <a:rPr lang="en-US" dirty="0"/>
+            </a:br>
+            <a:r>
+              <a:rPr lang="en-US" dirty="0"/>
+              <a:t>for IoT Core managed device</a:t>
             </a:r>
           </a:p>
         </p:txBody>
@@ -3383,7 +3390,7 @@
           <a:p>
             <a:r>
               <a:rPr lang="en-US" dirty="0"/>
-              <a:t>How Night’s Watch project comes</a:t>
+              <a:t>How project Night’s Watch comes</a:t>
             </a:r>
           </a:p>
           <a:p>
@@ -3415,6 +3422,36 @@
           </a:p>
         </p:txBody>
       </p:sp>
+      <p:pic>
+        <p:nvPicPr>
+          <p:cNvPr id="4" name="Picture 3">
+            <a:extLst>
+              <a:ext uri="{FF2B5EF4-FFF2-40B4-BE49-F238E27FC236}">
+                <a16:creationId xmlns:a16="http://schemas.microsoft.com/office/drawing/2014/main" id="{F121EFE8-26D3-844C-880D-0EF63C79FCCC}"/>
+              </a:ext>
+            </a:extLst>
+          </p:cNvPr>
+          <p:cNvPicPr>
+            <a:picLocks noChangeAspect="1"/>
+          </p:cNvPicPr>
+          <p:nvPr/>
+        </p:nvPicPr>
+        <p:blipFill>
+          <a:blip r:embed="rId2"/>
+          <a:stretch>
+            <a:fillRect/>
+          </a:stretch>
+        </p:blipFill>
+        <p:spPr>
+          <a:xfrm>
+            <a:off x="0" y="0"/>
+            <a:ext cx="12192000" cy="6858000"/>
+          </a:xfrm>
+          <a:prstGeom prst="rect">
+            <a:avLst/>
+          </a:prstGeom>
+        </p:spPr>
+      </p:pic>
     </p:spTree>
     <p:extLst>
       <p:ext uri="{BB962C8B-B14F-4D97-AF65-F5344CB8AC3E}">
@@ -3597,7 +3634,7 @@
             <a:pPr lvl="1"/>
             <a:r>
               <a:rPr lang="en-US" dirty="0"/>
-              <a:t>Deployed ~300, 000 devices in China, ~50,000 in WW, and growing quickly</a:t>
+              <a:t>Deployed ~300, 000 devices in China, ~50,000 in WW, and growing quickly.</a:t>
             </a:r>
           </a:p>
           <a:p>
@@ -3764,7 +3801,7 @@
             <a:pPr lvl="1"/>
             <a:r>
               <a:rPr lang="en-US" dirty="0"/>
-              <a:t>Spawning and running containers according to the OCI specification by </a:t>
+              <a:t>Spawning and running containers according to the OCI specification by project </a:t>
             </a:r>
             <a:r>
               <a:rPr lang="en-US" dirty="0" err="1"/>
@@ -3772,7 +3809,7 @@
             </a:r>
             <a:r>
               <a:rPr lang="en-US" dirty="0"/>
-              <a:t>[3] project.</a:t>
+              <a:t>[3].</a:t>
             </a:r>
           </a:p>
           <a:p>
@@ -3792,20 +3829,20 @@
             <a:pPr lvl="1"/>
             <a:r>
               <a:rPr lang="en-US" dirty="0"/>
-              <a:t>Night’s Watch – Ranger[5] project</a:t>
+              <a:t>Project Night’s Watch – Ranger[5]</a:t>
             </a:r>
           </a:p>
           <a:p>
             <a:r>
               <a:rPr lang="en-US" dirty="0"/>
-              <a:t>Control panel to setup the IoT stack (addition for demo, optional)</a:t>
+              <a:t>Control plane to setup the IoT stack (addition for demo, optional)</a:t>
             </a:r>
           </a:p>
           <a:p>
             <a:pPr lvl="1"/>
             <a:r>
               <a:rPr lang="en-US" dirty="0"/>
-              <a:t>Night’s Watch – Builder[6] project</a:t>
+              <a:t>Project Night’s Watch – Builder[6]</a:t>
             </a:r>
           </a:p>
         </p:txBody>

</xml_diff>

<commit_message>
Fix type in brownbag.pptx
</commit_message>
<xml_diff>
--- a/demo/brownbag.pptx
+++ b/demo/brownbag.pptx
@@ -263,7 +263,7 @@
           <a:p>
             <a:fld id="{44E6C336-FAC9-6D49-A0EB-D472925C8CE9}" type="datetimeFigureOut">
               <a:rPr lang="en-US" smtClean="0"/>
-              <a:t>11/19/19</a:t>
+              <a:t>12/11/19</a:t>
             </a:fld>
             <a:endParaRPr lang="en-US"/>
           </a:p>
@@ -461,7 +461,7 @@
           <a:p>
             <a:fld id="{44E6C336-FAC9-6D49-A0EB-D472925C8CE9}" type="datetimeFigureOut">
               <a:rPr lang="en-US" smtClean="0"/>
-              <a:t>11/19/19</a:t>
+              <a:t>12/11/19</a:t>
             </a:fld>
             <a:endParaRPr lang="en-US"/>
           </a:p>
@@ -669,7 +669,7 @@
           <a:p>
             <a:fld id="{44E6C336-FAC9-6D49-A0EB-D472925C8CE9}" type="datetimeFigureOut">
               <a:rPr lang="en-US" smtClean="0"/>
-              <a:t>11/19/19</a:t>
+              <a:t>12/11/19</a:t>
             </a:fld>
             <a:endParaRPr lang="en-US"/>
           </a:p>
@@ -867,7 +867,7 @@
           <a:p>
             <a:fld id="{44E6C336-FAC9-6D49-A0EB-D472925C8CE9}" type="datetimeFigureOut">
               <a:rPr lang="en-US" smtClean="0"/>
-              <a:t>11/19/19</a:t>
+              <a:t>12/11/19</a:t>
             </a:fld>
             <a:endParaRPr lang="en-US"/>
           </a:p>
@@ -1142,7 +1142,7 @@
           <a:p>
             <a:fld id="{44E6C336-FAC9-6D49-A0EB-D472925C8CE9}" type="datetimeFigureOut">
               <a:rPr lang="en-US" smtClean="0"/>
-              <a:t>11/19/19</a:t>
+              <a:t>12/11/19</a:t>
             </a:fld>
             <a:endParaRPr lang="en-US"/>
           </a:p>
@@ -1407,7 +1407,7 @@
           <a:p>
             <a:fld id="{44E6C336-FAC9-6D49-A0EB-D472925C8CE9}" type="datetimeFigureOut">
               <a:rPr lang="en-US" smtClean="0"/>
-              <a:t>11/19/19</a:t>
+              <a:t>12/11/19</a:t>
             </a:fld>
             <a:endParaRPr lang="en-US"/>
           </a:p>
@@ -1819,7 +1819,7 @@
           <a:p>
             <a:fld id="{44E6C336-FAC9-6D49-A0EB-D472925C8CE9}" type="datetimeFigureOut">
               <a:rPr lang="en-US" smtClean="0"/>
-              <a:t>11/19/19</a:t>
+              <a:t>12/11/19</a:t>
             </a:fld>
             <a:endParaRPr lang="en-US"/>
           </a:p>
@@ -1960,7 +1960,7 @@
           <a:p>
             <a:fld id="{44E6C336-FAC9-6D49-A0EB-D472925C8CE9}" type="datetimeFigureOut">
               <a:rPr lang="en-US" smtClean="0"/>
-              <a:t>11/19/19</a:t>
+              <a:t>12/11/19</a:t>
             </a:fld>
             <a:endParaRPr lang="en-US"/>
           </a:p>
@@ -2073,7 +2073,7 @@
           <a:p>
             <a:fld id="{44E6C336-FAC9-6D49-A0EB-D472925C8CE9}" type="datetimeFigureOut">
               <a:rPr lang="en-US" smtClean="0"/>
-              <a:t>11/19/19</a:t>
+              <a:t>12/11/19</a:t>
             </a:fld>
             <a:endParaRPr lang="en-US"/>
           </a:p>
@@ -2384,7 +2384,7 @@
           <a:p>
             <a:fld id="{44E6C336-FAC9-6D49-A0EB-D472925C8CE9}" type="datetimeFigureOut">
               <a:rPr lang="en-US" smtClean="0"/>
-              <a:t>11/19/19</a:t>
+              <a:t>12/11/19</a:t>
             </a:fld>
             <a:endParaRPr lang="en-US"/>
           </a:p>
@@ -2672,7 +2672,7 @@
           <a:p>
             <a:fld id="{44E6C336-FAC9-6D49-A0EB-D472925C8CE9}" type="datetimeFigureOut">
               <a:rPr lang="en-US" smtClean="0"/>
-              <a:t>11/19/19</a:t>
+              <a:t>12/11/19</a:t>
             </a:fld>
             <a:endParaRPr lang="en-US"/>
           </a:p>
@@ -2913,7 +2913,7 @@
           <a:p>
             <a:fld id="{44E6C336-FAC9-6D49-A0EB-D472925C8CE9}" type="datetimeFigureOut">
               <a:rPr lang="en-US" smtClean="0"/>
-              <a:t>11/19/19</a:t>
+              <a:t>12/11/19</a:t>
             </a:fld>
             <a:endParaRPr lang="en-US"/>
           </a:p>
@@ -3422,36 +3422,6 @@
           </a:p>
         </p:txBody>
       </p:sp>
-      <p:pic>
-        <p:nvPicPr>
-          <p:cNvPr id="4" name="Picture 3">
-            <a:extLst>
-              <a:ext uri="{FF2B5EF4-FFF2-40B4-BE49-F238E27FC236}">
-                <a16:creationId xmlns:a16="http://schemas.microsoft.com/office/drawing/2014/main" id="{F121EFE8-26D3-844C-880D-0EF63C79FCCC}"/>
-              </a:ext>
-            </a:extLst>
-          </p:cNvPr>
-          <p:cNvPicPr>
-            <a:picLocks noChangeAspect="1"/>
-          </p:cNvPicPr>
-          <p:nvPr/>
-        </p:nvPicPr>
-        <p:blipFill>
-          <a:blip r:embed="rId2"/>
-          <a:stretch>
-            <a:fillRect/>
-          </a:stretch>
-        </p:blipFill>
-        <p:spPr>
-          <a:xfrm>
-            <a:off x="0" y="0"/>
-            <a:ext cx="12192000" cy="6858000"/>
-          </a:xfrm>
-          <a:prstGeom prst="rect">
-            <a:avLst/>
-          </a:prstGeom>
-        </p:spPr>
-      </p:pic>
     </p:spTree>
     <p:extLst>
       <p:ext uri="{BB962C8B-B14F-4D97-AF65-F5344CB8AC3E}">

</xml_diff>